<commit_message>
Update Agent based models of debt and collapse.pptx
irrelevant changes during meeting
</commit_message>
<xml_diff>
--- a/Agent based models of debt and collapse.pptx
+++ b/Agent based models of debt and collapse.pptx
@@ -3016,7 +3016,7 @@
           <a:p>
             <a:fld id="{50338B4B-A277-4BA7-86EF-1DD5D04B792C}" type="datetimeFigureOut">
               <a:rPr lang="en-US" smtClean="0"/>
-              <a:t>10/10/2024</a:t>
+              <a:t>10/11/2024</a:t>
             </a:fld>
             <a:endParaRPr lang="en-US"/>
           </a:p>
@@ -4262,7 +4262,7 @@
           <a:p>
             <a:fld id="{7DB50319-FE91-4E73-956A-29A1EA144030}" type="datetimeFigureOut">
               <a:rPr lang="en-US" smtClean="0"/>
-              <a:t>10/10/2024</a:t>
+              <a:t>10/11/2024</a:t>
             </a:fld>
             <a:endParaRPr lang="en-US"/>
           </a:p>
@@ -4460,7 +4460,7 @@
           <a:p>
             <a:fld id="{7DB50319-FE91-4E73-956A-29A1EA144030}" type="datetimeFigureOut">
               <a:rPr lang="en-US" smtClean="0"/>
-              <a:t>10/10/2024</a:t>
+              <a:t>10/11/2024</a:t>
             </a:fld>
             <a:endParaRPr lang="en-US"/>
           </a:p>
@@ -4668,7 +4668,7 @@
           <a:p>
             <a:fld id="{7DB50319-FE91-4E73-956A-29A1EA144030}" type="datetimeFigureOut">
               <a:rPr lang="en-US" smtClean="0"/>
-              <a:t>10/10/2024</a:t>
+              <a:t>10/11/2024</a:t>
             </a:fld>
             <a:endParaRPr lang="en-US"/>
           </a:p>
@@ -4866,7 +4866,7 @@
           <a:p>
             <a:fld id="{7DB50319-FE91-4E73-956A-29A1EA144030}" type="datetimeFigureOut">
               <a:rPr lang="en-US" smtClean="0"/>
-              <a:t>10/10/2024</a:t>
+              <a:t>10/11/2024</a:t>
             </a:fld>
             <a:endParaRPr lang="en-US"/>
           </a:p>
@@ -5141,7 +5141,7 @@
           <a:p>
             <a:fld id="{7DB50319-FE91-4E73-956A-29A1EA144030}" type="datetimeFigureOut">
               <a:rPr lang="en-US" smtClean="0"/>
-              <a:t>10/10/2024</a:t>
+              <a:t>10/11/2024</a:t>
             </a:fld>
             <a:endParaRPr lang="en-US"/>
           </a:p>
@@ -5406,7 +5406,7 @@
           <a:p>
             <a:fld id="{7DB50319-FE91-4E73-956A-29A1EA144030}" type="datetimeFigureOut">
               <a:rPr lang="en-US" smtClean="0"/>
-              <a:t>10/10/2024</a:t>
+              <a:t>10/11/2024</a:t>
             </a:fld>
             <a:endParaRPr lang="en-US"/>
           </a:p>
@@ -5818,7 +5818,7 @@
           <a:p>
             <a:fld id="{7DB50319-FE91-4E73-956A-29A1EA144030}" type="datetimeFigureOut">
               <a:rPr lang="en-US" smtClean="0"/>
-              <a:t>10/10/2024</a:t>
+              <a:t>10/11/2024</a:t>
             </a:fld>
             <a:endParaRPr lang="en-US"/>
           </a:p>
@@ -5959,7 +5959,7 @@
           <a:p>
             <a:fld id="{7DB50319-FE91-4E73-956A-29A1EA144030}" type="datetimeFigureOut">
               <a:rPr lang="en-US" smtClean="0"/>
-              <a:t>10/10/2024</a:t>
+              <a:t>10/11/2024</a:t>
             </a:fld>
             <a:endParaRPr lang="en-US"/>
           </a:p>
@@ -6072,7 +6072,7 @@
           <a:p>
             <a:fld id="{7DB50319-FE91-4E73-956A-29A1EA144030}" type="datetimeFigureOut">
               <a:rPr lang="en-US" smtClean="0"/>
-              <a:t>10/10/2024</a:t>
+              <a:t>10/11/2024</a:t>
             </a:fld>
             <a:endParaRPr lang="en-US"/>
           </a:p>
@@ -6383,7 +6383,7 @@
           <a:p>
             <a:fld id="{7DB50319-FE91-4E73-956A-29A1EA144030}" type="datetimeFigureOut">
               <a:rPr lang="en-US" smtClean="0"/>
-              <a:t>10/10/2024</a:t>
+              <a:t>10/11/2024</a:t>
             </a:fld>
             <a:endParaRPr lang="en-US"/>
           </a:p>
@@ -6671,7 +6671,7 @@
           <a:p>
             <a:fld id="{7DB50319-FE91-4E73-956A-29A1EA144030}" type="datetimeFigureOut">
               <a:rPr lang="en-US" smtClean="0"/>
-              <a:t>10/10/2024</a:t>
+              <a:t>10/11/2024</a:t>
             </a:fld>
             <a:endParaRPr lang="en-US"/>
           </a:p>
@@ -6912,7 +6912,7 @@
           <a:p>
             <a:fld id="{7DB50319-FE91-4E73-956A-29A1EA144030}" type="datetimeFigureOut">
               <a:rPr lang="en-US" smtClean="0"/>
-              <a:t>10/10/2024</a:t>
+              <a:t>10/11/2024</a:t>
             </a:fld>
             <a:endParaRPr lang="en-US"/>
           </a:p>
@@ -12097,13 +12097,13 @@
   <p:clrMapOvr>
     <a:masterClrMapping/>
   </p:clrMapOvr>
-  <mc:AlternateContent xmlns:mc="http://schemas.openxmlformats.org/markup-compatibility/2006">
-    <mc:Choice xmlns:p159="http://schemas.microsoft.com/office/powerpoint/2015/09/main" Requires="p159">
+  <mc:AlternateContent xmlns:mc="http://schemas.openxmlformats.org/markup-compatibility/2006" xmlns:p159="http://schemas.microsoft.com/office/powerpoint/2015/09/main">
+    <mc:Choice Requires="p159">
       <p:transition xmlns:p14="http://schemas.microsoft.com/office/powerpoint/2010/main" spd="slow" p14:dur="2000">
         <p159:morph option="byObject"/>
       </p:transition>
     </mc:Choice>
-    <mc:Fallback>
+    <mc:Fallback xmlns="">
       <p:transition spd="slow">
         <p:fade/>
       </p:transition>
@@ -12929,13 +12929,13 @@
   <p:clrMapOvr>
     <a:masterClrMapping/>
   </p:clrMapOvr>
-  <mc:AlternateContent xmlns:mc="http://schemas.openxmlformats.org/markup-compatibility/2006">
-    <mc:Choice xmlns:p159="http://schemas.microsoft.com/office/powerpoint/2015/09/main" Requires="p159">
+  <mc:AlternateContent xmlns:mc="http://schemas.openxmlformats.org/markup-compatibility/2006" xmlns:p159="http://schemas.microsoft.com/office/powerpoint/2015/09/main">
+    <mc:Choice Requires="p159">
       <p:transition xmlns:p14="http://schemas.microsoft.com/office/powerpoint/2010/main" spd="slow" p14:dur="2000">
         <p159:morph option="byObject"/>
       </p:transition>
     </mc:Choice>
-    <mc:Fallback>
+    <mc:Fallback xmlns="">
       <p:transition spd="slow">
         <p:fade/>
       </p:transition>

</xml_diff>